<commit_message>
fix font error in figs. Correct some sentences. Add more ref.
</commit_message>
<xml_diff>
--- a/paper/tex/fig/concatSegments.pptx
+++ b/paper/tex/fig/concatSegments.pptx
@@ -157,7 +157,7 @@
           </a:lstStyle>
           <a:p>
             <a:r>
-              <a:rPr lang="de-DE" smtClean="0"/>
+              <a:rPr lang="de-DE"/>
               <a:t>Titelmasterformat durch Klicken bearbeiten</a:t>
             </a:r>
             <a:endParaRPr lang="en-US" dirty="0"/>
@@ -222,7 +222,7 @@
           </a:lstStyle>
           <a:p>
             <a:r>
-              <a:rPr lang="de-DE" smtClean="0"/>
+              <a:rPr lang="de-DE"/>
               <a:t>Formatvorlage des Untertitelmasters durch Klicken bearbeiten</a:t>
             </a:r>
             <a:endParaRPr lang="en-US" dirty="0"/>
@@ -246,7 +246,7 @@
           <a:p>
             <a:fld id="{EC93BBD2-B587-4421-B8E5-F07A11DB88D9}" type="datetimeFigureOut">
               <a:rPr lang="de-DE" smtClean="0"/>
-              <a:t>18.02.2020</a:t>
+              <a:t>29.02.2020</a:t>
             </a:fld>
             <a:endParaRPr lang="de-DE"/>
           </a:p>
@@ -340,7 +340,7 @@
           <a:lstStyle/>
           <a:p>
             <a:r>
-              <a:rPr lang="de-DE" smtClean="0"/>
+              <a:rPr lang="de-DE"/>
               <a:t>Titelmasterformat durch Klicken bearbeiten</a:t>
             </a:r>
             <a:endParaRPr lang="en-US" dirty="0"/>
@@ -364,35 +364,35 @@
           <a:p>
             <a:pPr lvl="0"/>
             <a:r>
-              <a:rPr lang="de-DE" smtClean="0"/>
+              <a:rPr lang="de-DE"/>
               <a:t>Formatvorlagen des Textmasters bearbeiten</a:t>
             </a:r>
           </a:p>
           <a:p>
             <a:pPr lvl="1"/>
             <a:r>
-              <a:rPr lang="de-DE" smtClean="0"/>
+              <a:rPr lang="de-DE"/>
               <a:t>Zweite Ebene</a:t>
             </a:r>
           </a:p>
           <a:p>
             <a:pPr lvl="2"/>
             <a:r>
-              <a:rPr lang="de-DE" smtClean="0"/>
+              <a:rPr lang="de-DE"/>
               <a:t>Dritte Ebene</a:t>
             </a:r>
           </a:p>
           <a:p>
             <a:pPr lvl="3"/>
             <a:r>
-              <a:rPr lang="de-DE" smtClean="0"/>
+              <a:rPr lang="de-DE"/>
               <a:t>Vierte Ebene</a:t>
             </a:r>
           </a:p>
           <a:p>
             <a:pPr lvl="4"/>
             <a:r>
-              <a:rPr lang="de-DE" smtClean="0"/>
+              <a:rPr lang="de-DE"/>
               <a:t>Fünfte Ebene</a:t>
             </a:r>
             <a:endParaRPr lang="en-US" dirty="0"/>
@@ -416,7 +416,7 @@
           <a:p>
             <a:fld id="{EC93BBD2-B587-4421-B8E5-F07A11DB88D9}" type="datetimeFigureOut">
               <a:rPr lang="de-DE" smtClean="0"/>
-              <a:t>18.02.2020</a:t>
+              <a:t>29.02.2020</a:t>
             </a:fld>
             <a:endParaRPr lang="de-DE"/>
           </a:p>
@@ -515,7 +515,7 @@
           <a:lstStyle/>
           <a:p>
             <a:r>
-              <a:rPr lang="de-DE" smtClean="0"/>
+              <a:rPr lang="de-DE"/>
               <a:t>Titelmasterformat durch Klicken bearbeiten</a:t>
             </a:r>
             <a:endParaRPr lang="en-US" dirty="0"/>
@@ -544,35 +544,35 @@
           <a:p>
             <a:pPr lvl="0"/>
             <a:r>
-              <a:rPr lang="de-DE" smtClean="0"/>
+              <a:rPr lang="de-DE"/>
               <a:t>Formatvorlagen des Textmasters bearbeiten</a:t>
             </a:r>
           </a:p>
           <a:p>
             <a:pPr lvl="1"/>
             <a:r>
-              <a:rPr lang="de-DE" smtClean="0"/>
+              <a:rPr lang="de-DE"/>
               <a:t>Zweite Ebene</a:t>
             </a:r>
           </a:p>
           <a:p>
             <a:pPr lvl="2"/>
             <a:r>
-              <a:rPr lang="de-DE" smtClean="0"/>
+              <a:rPr lang="de-DE"/>
               <a:t>Dritte Ebene</a:t>
             </a:r>
           </a:p>
           <a:p>
             <a:pPr lvl="3"/>
             <a:r>
-              <a:rPr lang="de-DE" smtClean="0"/>
+              <a:rPr lang="de-DE"/>
               <a:t>Vierte Ebene</a:t>
             </a:r>
           </a:p>
           <a:p>
             <a:pPr lvl="4"/>
             <a:r>
-              <a:rPr lang="de-DE" smtClean="0"/>
+              <a:rPr lang="de-DE"/>
               <a:t>Fünfte Ebene</a:t>
             </a:r>
             <a:endParaRPr lang="en-US" dirty="0"/>
@@ -596,7 +596,7 @@
           <a:p>
             <a:fld id="{EC93BBD2-B587-4421-B8E5-F07A11DB88D9}" type="datetimeFigureOut">
               <a:rPr lang="de-DE" smtClean="0"/>
-              <a:t>18.02.2020</a:t>
+              <a:t>29.02.2020</a:t>
             </a:fld>
             <a:endParaRPr lang="de-DE"/>
           </a:p>
@@ -690,7 +690,7 @@
           <a:lstStyle/>
           <a:p>
             <a:r>
-              <a:rPr lang="de-DE" smtClean="0"/>
+              <a:rPr lang="de-DE"/>
               <a:t>Titelmasterformat durch Klicken bearbeiten</a:t>
             </a:r>
             <a:endParaRPr lang="en-US" dirty="0"/>
@@ -714,35 +714,35 @@
           <a:p>
             <a:pPr lvl="0"/>
             <a:r>
-              <a:rPr lang="de-DE" smtClean="0"/>
+              <a:rPr lang="de-DE"/>
               <a:t>Formatvorlagen des Textmasters bearbeiten</a:t>
             </a:r>
           </a:p>
           <a:p>
             <a:pPr lvl="1"/>
             <a:r>
-              <a:rPr lang="de-DE" smtClean="0"/>
+              <a:rPr lang="de-DE"/>
               <a:t>Zweite Ebene</a:t>
             </a:r>
           </a:p>
           <a:p>
             <a:pPr lvl="2"/>
             <a:r>
-              <a:rPr lang="de-DE" smtClean="0"/>
+              <a:rPr lang="de-DE"/>
               <a:t>Dritte Ebene</a:t>
             </a:r>
           </a:p>
           <a:p>
             <a:pPr lvl="3"/>
             <a:r>
-              <a:rPr lang="de-DE" smtClean="0"/>
+              <a:rPr lang="de-DE"/>
               <a:t>Vierte Ebene</a:t>
             </a:r>
           </a:p>
           <a:p>
             <a:pPr lvl="4"/>
             <a:r>
-              <a:rPr lang="de-DE" smtClean="0"/>
+              <a:rPr lang="de-DE"/>
               <a:t>Fünfte Ebene</a:t>
             </a:r>
             <a:endParaRPr lang="en-US" dirty="0"/>
@@ -766,7 +766,7 @@
           <a:p>
             <a:fld id="{EC93BBD2-B587-4421-B8E5-F07A11DB88D9}" type="datetimeFigureOut">
               <a:rPr lang="de-DE" smtClean="0"/>
-              <a:t>18.02.2020</a:t>
+              <a:t>29.02.2020</a:t>
             </a:fld>
             <a:endParaRPr lang="de-DE"/>
           </a:p>
@@ -869,7 +869,7 @@
           </a:lstStyle>
           <a:p>
             <a:r>
-              <a:rPr lang="de-DE" smtClean="0"/>
+              <a:rPr lang="de-DE"/>
               <a:t>Titelmasterformat durch Klicken bearbeiten</a:t>
             </a:r>
             <a:endParaRPr lang="en-US" dirty="0"/>
@@ -989,7 +989,7 @@
           <a:p>
             <a:pPr lvl="0"/>
             <a:r>
-              <a:rPr lang="de-DE" smtClean="0"/>
+              <a:rPr lang="de-DE"/>
               <a:t>Formatvorlagen des Textmasters bearbeiten</a:t>
             </a:r>
           </a:p>
@@ -1012,7 +1012,7 @@
           <a:p>
             <a:fld id="{EC93BBD2-B587-4421-B8E5-F07A11DB88D9}" type="datetimeFigureOut">
               <a:rPr lang="de-DE" smtClean="0"/>
-              <a:t>18.02.2020</a:t>
+              <a:t>29.02.2020</a:t>
             </a:fld>
             <a:endParaRPr lang="de-DE"/>
           </a:p>
@@ -1106,7 +1106,7 @@
           <a:lstStyle/>
           <a:p>
             <a:r>
-              <a:rPr lang="de-DE" smtClean="0"/>
+              <a:rPr lang="de-DE"/>
               <a:t>Titelmasterformat durch Klicken bearbeiten</a:t>
             </a:r>
             <a:endParaRPr lang="en-US" dirty="0"/>
@@ -1135,35 +1135,35 @@
           <a:p>
             <a:pPr lvl="0"/>
             <a:r>
-              <a:rPr lang="de-DE" smtClean="0"/>
+              <a:rPr lang="de-DE"/>
               <a:t>Formatvorlagen des Textmasters bearbeiten</a:t>
             </a:r>
           </a:p>
           <a:p>
             <a:pPr lvl="1"/>
             <a:r>
-              <a:rPr lang="de-DE" smtClean="0"/>
+              <a:rPr lang="de-DE"/>
               <a:t>Zweite Ebene</a:t>
             </a:r>
           </a:p>
           <a:p>
             <a:pPr lvl="2"/>
             <a:r>
-              <a:rPr lang="de-DE" smtClean="0"/>
+              <a:rPr lang="de-DE"/>
               <a:t>Dritte Ebene</a:t>
             </a:r>
           </a:p>
           <a:p>
             <a:pPr lvl="3"/>
             <a:r>
-              <a:rPr lang="de-DE" smtClean="0"/>
+              <a:rPr lang="de-DE"/>
               <a:t>Vierte Ebene</a:t>
             </a:r>
           </a:p>
           <a:p>
             <a:pPr lvl="4"/>
             <a:r>
-              <a:rPr lang="de-DE" smtClean="0"/>
+              <a:rPr lang="de-DE"/>
               <a:t>Fünfte Ebene</a:t>
             </a:r>
             <a:endParaRPr lang="en-US" dirty="0"/>
@@ -1192,35 +1192,35 @@
           <a:p>
             <a:pPr lvl="0"/>
             <a:r>
-              <a:rPr lang="de-DE" smtClean="0"/>
+              <a:rPr lang="de-DE"/>
               <a:t>Formatvorlagen des Textmasters bearbeiten</a:t>
             </a:r>
           </a:p>
           <a:p>
             <a:pPr lvl="1"/>
             <a:r>
-              <a:rPr lang="de-DE" smtClean="0"/>
+              <a:rPr lang="de-DE"/>
               <a:t>Zweite Ebene</a:t>
             </a:r>
           </a:p>
           <a:p>
             <a:pPr lvl="2"/>
             <a:r>
-              <a:rPr lang="de-DE" smtClean="0"/>
+              <a:rPr lang="de-DE"/>
               <a:t>Dritte Ebene</a:t>
             </a:r>
           </a:p>
           <a:p>
             <a:pPr lvl="3"/>
             <a:r>
-              <a:rPr lang="de-DE" smtClean="0"/>
+              <a:rPr lang="de-DE"/>
               <a:t>Vierte Ebene</a:t>
             </a:r>
           </a:p>
           <a:p>
             <a:pPr lvl="4"/>
             <a:r>
-              <a:rPr lang="de-DE" smtClean="0"/>
+              <a:rPr lang="de-DE"/>
               <a:t>Fünfte Ebene</a:t>
             </a:r>
             <a:endParaRPr lang="en-US" dirty="0"/>
@@ -1244,7 +1244,7 @@
           <a:p>
             <a:fld id="{EC93BBD2-B587-4421-B8E5-F07A11DB88D9}" type="datetimeFigureOut">
               <a:rPr lang="de-DE" smtClean="0"/>
-              <a:t>18.02.2020</a:t>
+              <a:t>29.02.2020</a:t>
             </a:fld>
             <a:endParaRPr lang="de-DE"/>
           </a:p>
@@ -1343,7 +1343,7 @@
           <a:lstStyle/>
           <a:p>
             <a:r>
-              <a:rPr lang="de-DE" smtClean="0"/>
+              <a:rPr lang="de-DE"/>
               <a:t>Titelmasterformat durch Klicken bearbeiten</a:t>
             </a:r>
             <a:endParaRPr lang="en-US" dirty="0"/>
@@ -1409,7 +1409,7 @@
           <a:p>
             <a:pPr lvl="0"/>
             <a:r>
-              <a:rPr lang="de-DE" smtClean="0"/>
+              <a:rPr lang="de-DE"/>
               <a:t>Formatvorlagen des Textmasters bearbeiten</a:t>
             </a:r>
           </a:p>
@@ -1437,35 +1437,35 @@
           <a:p>
             <a:pPr lvl="0"/>
             <a:r>
-              <a:rPr lang="de-DE" smtClean="0"/>
+              <a:rPr lang="de-DE"/>
               <a:t>Formatvorlagen des Textmasters bearbeiten</a:t>
             </a:r>
           </a:p>
           <a:p>
             <a:pPr lvl="1"/>
             <a:r>
-              <a:rPr lang="de-DE" smtClean="0"/>
+              <a:rPr lang="de-DE"/>
               <a:t>Zweite Ebene</a:t>
             </a:r>
           </a:p>
           <a:p>
             <a:pPr lvl="2"/>
             <a:r>
-              <a:rPr lang="de-DE" smtClean="0"/>
+              <a:rPr lang="de-DE"/>
               <a:t>Dritte Ebene</a:t>
             </a:r>
           </a:p>
           <a:p>
             <a:pPr lvl="3"/>
             <a:r>
-              <a:rPr lang="de-DE" smtClean="0"/>
+              <a:rPr lang="de-DE"/>
               <a:t>Vierte Ebene</a:t>
             </a:r>
           </a:p>
           <a:p>
             <a:pPr lvl="4"/>
             <a:r>
-              <a:rPr lang="de-DE" smtClean="0"/>
+              <a:rPr lang="de-DE"/>
               <a:t>Fünfte Ebene</a:t>
             </a:r>
             <a:endParaRPr lang="en-US" dirty="0"/>
@@ -1531,7 +1531,7 @@
           <a:p>
             <a:pPr lvl="0"/>
             <a:r>
-              <a:rPr lang="de-DE" smtClean="0"/>
+              <a:rPr lang="de-DE"/>
               <a:t>Formatvorlagen des Textmasters bearbeiten</a:t>
             </a:r>
           </a:p>
@@ -1559,35 +1559,35 @@
           <a:p>
             <a:pPr lvl="0"/>
             <a:r>
-              <a:rPr lang="de-DE" smtClean="0"/>
+              <a:rPr lang="de-DE"/>
               <a:t>Formatvorlagen des Textmasters bearbeiten</a:t>
             </a:r>
           </a:p>
           <a:p>
             <a:pPr lvl="1"/>
             <a:r>
-              <a:rPr lang="de-DE" smtClean="0"/>
+              <a:rPr lang="de-DE"/>
               <a:t>Zweite Ebene</a:t>
             </a:r>
           </a:p>
           <a:p>
             <a:pPr lvl="2"/>
             <a:r>
-              <a:rPr lang="de-DE" smtClean="0"/>
+              <a:rPr lang="de-DE"/>
               <a:t>Dritte Ebene</a:t>
             </a:r>
           </a:p>
           <a:p>
             <a:pPr lvl="3"/>
             <a:r>
-              <a:rPr lang="de-DE" smtClean="0"/>
+              <a:rPr lang="de-DE"/>
               <a:t>Vierte Ebene</a:t>
             </a:r>
           </a:p>
           <a:p>
             <a:pPr lvl="4"/>
             <a:r>
-              <a:rPr lang="de-DE" smtClean="0"/>
+              <a:rPr lang="de-DE"/>
               <a:t>Fünfte Ebene</a:t>
             </a:r>
             <a:endParaRPr lang="en-US" dirty="0"/>
@@ -1611,7 +1611,7 @@
           <a:p>
             <a:fld id="{EC93BBD2-B587-4421-B8E5-F07A11DB88D9}" type="datetimeFigureOut">
               <a:rPr lang="de-DE" smtClean="0"/>
-              <a:t>18.02.2020</a:t>
+              <a:t>29.02.2020</a:t>
             </a:fld>
             <a:endParaRPr lang="de-DE"/>
           </a:p>
@@ -1705,7 +1705,7 @@
           <a:lstStyle/>
           <a:p>
             <a:r>
-              <a:rPr lang="de-DE" smtClean="0"/>
+              <a:rPr lang="de-DE"/>
               <a:t>Titelmasterformat durch Klicken bearbeiten</a:t>
             </a:r>
             <a:endParaRPr lang="en-US" dirty="0"/>
@@ -1729,7 +1729,7 @@
           <a:p>
             <a:fld id="{EC93BBD2-B587-4421-B8E5-F07A11DB88D9}" type="datetimeFigureOut">
               <a:rPr lang="de-DE" smtClean="0"/>
-              <a:t>18.02.2020</a:t>
+              <a:t>29.02.2020</a:t>
             </a:fld>
             <a:endParaRPr lang="de-DE"/>
           </a:p>
@@ -1824,7 +1824,7 @@
           <a:p>
             <a:fld id="{EC93BBD2-B587-4421-B8E5-F07A11DB88D9}" type="datetimeFigureOut">
               <a:rPr lang="de-DE" smtClean="0"/>
-              <a:t>18.02.2020</a:t>
+              <a:t>29.02.2020</a:t>
             </a:fld>
             <a:endParaRPr lang="de-DE"/>
           </a:p>
@@ -1927,7 +1927,7 @@
           </a:lstStyle>
           <a:p>
             <a:r>
-              <a:rPr lang="de-DE" smtClean="0"/>
+              <a:rPr lang="de-DE"/>
               <a:t>Titelmasterformat durch Klicken bearbeiten</a:t>
             </a:r>
             <a:endParaRPr lang="en-US" dirty="0"/>
@@ -1984,35 +1984,35 @@
           <a:p>
             <a:pPr lvl="0"/>
             <a:r>
-              <a:rPr lang="de-DE" smtClean="0"/>
+              <a:rPr lang="de-DE"/>
               <a:t>Formatvorlagen des Textmasters bearbeiten</a:t>
             </a:r>
           </a:p>
           <a:p>
             <a:pPr lvl="1"/>
             <a:r>
-              <a:rPr lang="de-DE" smtClean="0"/>
+              <a:rPr lang="de-DE"/>
               <a:t>Zweite Ebene</a:t>
             </a:r>
           </a:p>
           <a:p>
             <a:pPr lvl="2"/>
             <a:r>
-              <a:rPr lang="de-DE" smtClean="0"/>
+              <a:rPr lang="de-DE"/>
               <a:t>Dritte Ebene</a:t>
             </a:r>
           </a:p>
           <a:p>
             <a:pPr lvl="3"/>
             <a:r>
-              <a:rPr lang="de-DE" smtClean="0"/>
+              <a:rPr lang="de-DE"/>
               <a:t>Vierte Ebene</a:t>
             </a:r>
           </a:p>
           <a:p>
             <a:pPr lvl="4"/>
             <a:r>
-              <a:rPr lang="de-DE" smtClean="0"/>
+              <a:rPr lang="de-DE"/>
               <a:t>Fünfte Ebene</a:t>
             </a:r>
             <a:endParaRPr lang="en-US" dirty="0"/>
@@ -2078,7 +2078,7 @@
           <a:p>
             <a:pPr lvl="0"/>
             <a:r>
-              <a:rPr lang="de-DE" smtClean="0"/>
+              <a:rPr lang="de-DE"/>
               <a:t>Formatvorlagen des Textmasters bearbeiten</a:t>
             </a:r>
           </a:p>
@@ -2101,7 +2101,7 @@
           <a:p>
             <a:fld id="{EC93BBD2-B587-4421-B8E5-F07A11DB88D9}" type="datetimeFigureOut">
               <a:rPr lang="de-DE" smtClean="0"/>
-              <a:t>18.02.2020</a:t>
+              <a:t>29.02.2020</a:t>
             </a:fld>
             <a:endParaRPr lang="de-DE"/>
           </a:p>
@@ -2204,7 +2204,7 @@
           </a:lstStyle>
           <a:p>
             <a:r>
-              <a:rPr lang="de-DE" smtClean="0"/>
+              <a:rPr lang="de-DE"/>
               <a:t>Titelmasterformat durch Klicken bearbeiten</a:t>
             </a:r>
             <a:endParaRPr lang="en-US" dirty="0"/>
@@ -2269,7 +2269,7 @@
           </a:lstStyle>
           <a:p>
             <a:r>
-              <a:rPr lang="de-DE" smtClean="0"/>
+              <a:rPr lang="de-DE"/>
               <a:t>Bild durch Klicken auf Symbol hinzufügen</a:t>
             </a:r>
             <a:endParaRPr lang="en-US" dirty="0"/>
@@ -2335,7 +2335,7 @@
           <a:p>
             <a:pPr lvl="0"/>
             <a:r>
-              <a:rPr lang="de-DE" smtClean="0"/>
+              <a:rPr lang="de-DE"/>
               <a:t>Formatvorlagen des Textmasters bearbeiten</a:t>
             </a:r>
           </a:p>
@@ -2358,7 +2358,7 @@
           <a:p>
             <a:fld id="{EC93BBD2-B587-4421-B8E5-F07A11DB88D9}" type="datetimeFigureOut">
               <a:rPr lang="de-DE" smtClean="0"/>
-              <a:t>18.02.2020</a:t>
+              <a:t>29.02.2020</a:t>
             </a:fld>
             <a:endParaRPr lang="de-DE"/>
           </a:p>
@@ -2467,7 +2467,7 @@
           <a:lstStyle/>
           <a:p>
             <a:r>
-              <a:rPr lang="de-DE" smtClean="0"/>
+              <a:rPr lang="de-DE"/>
               <a:t>Titelmasterformat durch Klicken bearbeiten</a:t>
             </a:r>
             <a:endParaRPr lang="en-US" dirty="0"/>
@@ -2501,35 +2501,35 @@
           <a:p>
             <a:pPr lvl="0"/>
             <a:r>
-              <a:rPr lang="de-DE" smtClean="0"/>
+              <a:rPr lang="de-DE"/>
               <a:t>Formatvorlagen des Textmasters bearbeiten</a:t>
             </a:r>
           </a:p>
           <a:p>
             <a:pPr lvl="1"/>
             <a:r>
-              <a:rPr lang="de-DE" smtClean="0"/>
+              <a:rPr lang="de-DE"/>
               <a:t>Zweite Ebene</a:t>
             </a:r>
           </a:p>
           <a:p>
             <a:pPr lvl="2"/>
             <a:r>
-              <a:rPr lang="de-DE" smtClean="0"/>
+              <a:rPr lang="de-DE"/>
               <a:t>Dritte Ebene</a:t>
             </a:r>
           </a:p>
           <a:p>
             <a:pPr lvl="3"/>
             <a:r>
-              <a:rPr lang="de-DE" smtClean="0"/>
+              <a:rPr lang="de-DE"/>
               <a:t>Vierte Ebene</a:t>
             </a:r>
           </a:p>
           <a:p>
             <a:pPr lvl="4"/>
             <a:r>
-              <a:rPr lang="de-DE" smtClean="0"/>
+              <a:rPr lang="de-DE"/>
               <a:t>Fünfte Ebene</a:t>
             </a:r>
             <a:endParaRPr lang="en-US" dirty="0"/>
@@ -2571,7 +2571,7 @@
           <a:p>
             <a:fld id="{EC93BBD2-B587-4421-B8E5-F07A11DB88D9}" type="datetimeFigureOut">
               <a:rPr lang="de-DE" smtClean="0"/>
-              <a:t>18.02.2020</a:t>
+              <a:t>29.02.2020</a:t>
             </a:fld>
             <a:endParaRPr lang="de-DE"/>
           </a:p>
@@ -2680,7 +2680,7 @@
           <a:graphicData uri="http://schemas.openxmlformats.org/presentationml/2006/ole">
             <mc:AlternateContent xmlns:mc="http://schemas.openxmlformats.org/markup-compatibility/2006">
               <mc:Choice xmlns:v="urn:schemas-microsoft-com:vml" Requires="v">
-                <p:oleObj spid="_x0000_s5123" name="think-cell Folie" r:id="rId16" imgW="384" imgH="384" progId="TCLayout.ActiveDocument.1">
+                <p:oleObj spid="_x0000_s5124" name="think-cell Folie" r:id="rId16" imgW="384" imgH="384" progId="TCLayout.ActiveDocument.1">
                   <p:embed/>
                 </p:oleObj>
               </mc:Choice>
@@ -3115,7 +3115,7 @@
           <a:graphicData uri="http://schemas.openxmlformats.org/presentationml/2006/ole">
             <mc:AlternateContent xmlns:mc="http://schemas.openxmlformats.org/markup-compatibility/2006">
               <mc:Choice xmlns:v="urn:schemas-microsoft-com:vml" Requires="v">
-                <p:oleObj spid="_x0000_s2065" name="think-cell Folie" r:id="rId4" imgW="384" imgH="384" progId="TCLayout.ActiveDocument.1">
+                <p:oleObj spid="_x0000_s2066" name="think-cell Folie" r:id="rId4" imgW="384" imgH="384" progId="TCLayout.ActiveDocument.1">
                   <p:embed/>
                 </p:oleObj>
               </mc:Choice>
@@ -3159,7 +3159,7 @@
         <p:spPr>
           <a:xfrm>
             <a:off x="-87620" y="-78258"/>
-            <a:ext cx="293670" cy="261610"/>
+            <a:ext cx="285656" cy="246221"/>
           </a:xfrm>
           <a:prstGeom prst="rect">
             <a:avLst/>
@@ -3173,7 +3173,7 @@
           <a:lstStyle/>
           <a:p>
             <a:r>
-              <a:rPr lang="de-DE" sz="1100" dirty="0">
+              <a:rPr lang="de-DE" sz="1000" dirty="0">
                 <a:latin typeface="Times New Roman" panose="02020603050405020304" pitchFamily="18" charset="0"/>
                 <a:cs typeface="Times New Roman" panose="02020603050405020304" pitchFamily="18" charset="0"/>
               </a:rPr>
@@ -3191,7 +3191,7 @@
         <p:spPr>
           <a:xfrm>
             <a:off x="1411505" y="-78258"/>
-            <a:ext cx="301686" cy="261610"/>
+            <a:ext cx="292068" cy="246221"/>
           </a:xfrm>
           <a:prstGeom prst="rect">
             <a:avLst/>
@@ -3205,7 +3205,7 @@
           <a:lstStyle/>
           <a:p>
             <a:r>
-              <a:rPr lang="de-DE" sz="1100" dirty="0">
+              <a:rPr lang="de-DE" sz="1000" dirty="0">
                 <a:latin typeface="Times New Roman" panose="02020603050405020304" pitchFamily="18" charset="0"/>
                 <a:cs typeface="Times New Roman" panose="02020603050405020304" pitchFamily="18" charset="0"/>
               </a:rPr>
@@ -3264,7 +3264,7 @@
             <p:spPr>
               <a:xfrm>
                 <a:off x="1583342" y="-27253"/>
-                <a:ext cx="277961" cy="227755"/>
+                <a:ext cx="269754" cy="215444"/>
               </a:xfrm>
               <a:prstGeom prst="rect">
                 <a:avLst/>
@@ -3288,7 +3288,7 @@
                     </m:oMathParaPr>
                     <m:oMath xmlns:m="http://schemas.openxmlformats.org/officeDocument/2006/math">
                       <m:r>
-                        <a:rPr lang="de-DE" sz="880" i="1" kern="0">
+                        <a:rPr lang="de-DE" sz="800" i="1" kern="0">
                           <a:solidFill>
                             <a:srgbClr val="171717"/>
                           </a:solidFill>
@@ -3300,7 +3300,7 @@
                     </m:oMath>
                   </m:oMathPara>
                 </a14:m>
-                <a:endParaRPr lang="de-DE" sz="880" kern="0" dirty="0">
+                <a:endParaRPr lang="de-DE" sz="800" kern="0" dirty="0">
                   <a:solidFill>
                     <a:srgbClr val="171717"/>
                   </a:solidFill>
@@ -3329,7 +3329,7 @@
             <p:spPr>
               <a:xfrm>
                 <a:off x="1583342" y="-27253"/>
-                <a:ext cx="277961" cy="227755"/>
+                <a:ext cx="269754" cy="215444"/>
               </a:xfrm>
               <a:prstGeom prst="rect">
                 <a:avLst/>
@@ -4263,7 +4263,7 @@
             <p:spPr>
               <a:xfrm>
                 <a:off x="2912000" y="1413235"/>
-                <a:ext cx="276229" cy="227755"/>
+                <a:ext cx="267894" cy="215444"/>
               </a:xfrm>
               <a:prstGeom prst="rect">
                 <a:avLst/>
@@ -4287,7 +4287,7 @@
                     </m:oMathParaPr>
                     <m:oMath xmlns:m="http://schemas.openxmlformats.org/officeDocument/2006/math">
                       <m:r>
-                        <a:rPr lang="de-DE" sz="880" i="1" kern="0">
+                        <a:rPr lang="de-DE" sz="800" i="1" kern="0">
                           <a:solidFill>
                             <a:srgbClr val="171717"/>
                           </a:solidFill>
@@ -4299,7 +4299,7 @@
                     </m:oMath>
                   </m:oMathPara>
                 </a14:m>
-                <a:endParaRPr lang="de-DE" sz="880" kern="0" dirty="0">
+                <a:endParaRPr lang="de-DE" sz="800" kern="0" dirty="0">
                   <a:solidFill>
                     <a:srgbClr val="171717"/>
                   </a:solidFill>
@@ -4328,7 +4328,7 @@
             <p:spPr>
               <a:xfrm>
                 <a:off x="2912000" y="1413235"/>
-                <a:ext cx="276229" cy="227755"/>
+                <a:ext cx="267894" cy="215444"/>
               </a:xfrm>
               <a:prstGeom prst="rect">
                 <a:avLst/>
@@ -4358,8 +4358,8 @@
           </p:sp>
         </mc:Fallback>
       </mc:AlternateContent>
-      <mc:AlternateContent xmlns:mc="http://schemas.openxmlformats.org/markup-compatibility/2006">
-        <mc:Choice xmlns:a14="http://schemas.microsoft.com/office/drawing/2010/main" Requires="a14">
+      <mc:AlternateContent xmlns:mc="http://schemas.openxmlformats.org/markup-compatibility/2006" xmlns:a14="http://schemas.microsoft.com/office/drawing/2010/main">
+        <mc:Choice Requires="a14">
           <p:sp>
             <p:nvSpPr>
               <p:cNvPr id="307" name="Textfeld 306">
@@ -4449,7 +4449,7 @@
             </p:txBody>
           </p:sp>
         </mc:Choice>
-        <mc:Fallback>
+        <mc:Fallback xmlns="">
           <p:sp>
             <p:nvSpPr>
               <p:cNvPr id="307" name="Textfeld 306">
@@ -4497,8 +4497,8 @@
           </p:sp>
         </mc:Fallback>
       </mc:AlternateContent>
-      <mc:AlternateContent xmlns:mc="http://schemas.openxmlformats.org/markup-compatibility/2006">
-        <mc:Choice xmlns:a14="http://schemas.microsoft.com/office/drawing/2010/main" Requires="a14">
+      <mc:AlternateContent xmlns:mc="http://schemas.openxmlformats.org/markup-compatibility/2006" xmlns:a14="http://schemas.microsoft.com/office/drawing/2010/main">
+        <mc:Choice Requires="a14">
           <p:sp>
             <p:nvSpPr>
               <p:cNvPr id="308" name="Textfeld 307">
@@ -4588,7 +4588,7 @@
             </p:txBody>
           </p:sp>
         </mc:Choice>
-        <mc:Fallback>
+        <mc:Fallback xmlns="">
           <p:sp>
             <p:nvSpPr>
               <p:cNvPr id="308" name="Textfeld 307">
@@ -4686,7 +4686,7 @@
             <p:spPr>
               <a:xfrm>
                 <a:off x="71879" y="-27253"/>
-                <a:ext cx="277961" cy="227755"/>
+                <a:ext cx="269754" cy="215444"/>
               </a:xfrm>
               <a:prstGeom prst="rect">
                 <a:avLst/>
@@ -4710,7 +4710,7 @@
                     </m:oMathParaPr>
                     <m:oMath xmlns:m="http://schemas.openxmlformats.org/officeDocument/2006/math">
                       <m:r>
-                        <a:rPr lang="de-DE" sz="880" i="1" kern="0">
+                        <a:rPr lang="de-DE" sz="800" i="1" kern="0">
                           <a:solidFill>
                             <a:srgbClr val="171717"/>
                           </a:solidFill>
@@ -4722,7 +4722,7 @@
                     </m:oMath>
                   </m:oMathPara>
                 </a14:m>
-                <a:endParaRPr lang="de-DE" sz="880" kern="0" dirty="0">
+                <a:endParaRPr lang="de-DE" sz="800" kern="0" dirty="0">
                   <a:solidFill>
                     <a:srgbClr val="171717"/>
                   </a:solidFill>
@@ -4751,7 +4751,7 @@
             <p:spPr>
               <a:xfrm>
                 <a:off x="71879" y="-27253"/>
-                <a:ext cx="277961" cy="227755"/>
+                <a:ext cx="269754" cy="215444"/>
               </a:xfrm>
               <a:prstGeom prst="rect">
                 <a:avLst/>
@@ -4831,7 +4831,7 @@
             <p:spPr>
               <a:xfrm>
                 <a:off x="1400537" y="1413235"/>
-                <a:ext cx="276229" cy="227755"/>
+                <a:ext cx="267894" cy="215444"/>
               </a:xfrm>
               <a:prstGeom prst="rect">
                 <a:avLst/>
@@ -4855,7 +4855,7 @@
                     </m:oMathParaPr>
                     <m:oMath xmlns:m="http://schemas.openxmlformats.org/officeDocument/2006/math">
                       <m:r>
-                        <a:rPr lang="de-DE" sz="880" i="1" kern="0">
+                        <a:rPr lang="de-DE" sz="800" i="1" kern="0">
                           <a:solidFill>
                             <a:srgbClr val="171717"/>
                           </a:solidFill>
@@ -4867,7 +4867,7 @@
                     </m:oMath>
                   </m:oMathPara>
                 </a14:m>
-                <a:endParaRPr lang="de-DE" sz="880" kern="0" dirty="0">
+                <a:endParaRPr lang="de-DE" sz="800" kern="0" dirty="0">
                   <a:solidFill>
                     <a:srgbClr val="171717"/>
                   </a:solidFill>
@@ -4896,7 +4896,7 @@
             <p:spPr>
               <a:xfrm>
                 <a:off x="1400537" y="1413235"/>
-                <a:ext cx="276229" cy="227755"/>
+                <a:ext cx="267894" cy="215444"/>
               </a:xfrm>
               <a:prstGeom prst="rect">
                 <a:avLst/>
@@ -5453,8 +5453,8 @@
           </a:fontRef>
         </p:style>
       </p:cxnSp>
-      <mc:AlternateContent xmlns:mc="http://schemas.openxmlformats.org/markup-compatibility/2006">
-        <mc:Choice xmlns:a14="http://schemas.microsoft.com/office/drawing/2010/main" Requires="a14">
+      <mc:AlternateContent xmlns:mc="http://schemas.openxmlformats.org/markup-compatibility/2006" xmlns:a14="http://schemas.microsoft.com/office/drawing/2010/main">
+        <mc:Choice Requires="a14">
           <p:sp>
             <p:nvSpPr>
               <p:cNvPr id="214" name="Textfeld 213">
@@ -5483,6 +5483,7 @@
               </a:bodyPr>
               <a:lstStyle/>
               <a:p>
+                <a:pPr/>
                 <a14:m>
                   <m:oMathPara xmlns:m="http://schemas.openxmlformats.org/officeDocument/2006/math">
                     <m:oMathParaPr>
@@ -5525,7 +5526,7 @@
             </p:txBody>
           </p:sp>
         </mc:Choice>
-        <mc:Fallback>
+        <mc:Fallback xmlns="">
           <p:sp>
             <p:nvSpPr>
               <p:cNvPr id="214" name="Textfeld 213">
@@ -5570,8 +5571,8 @@
           </p:sp>
         </mc:Fallback>
       </mc:AlternateContent>
-      <mc:AlternateContent xmlns:mc="http://schemas.openxmlformats.org/markup-compatibility/2006">
-        <mc:Choice xmlns:a14="http://schemas.microsoft.com/office/drawing/2010/main" Requires="a14">
+      <mc:AlternateContent xmlns:mc="http://schemas.openxmlformats.org/markup-compatibility/2006" xmlns:a14="http://schemas.microsoft.com/office/drawing/2010/main">
+        <mc:Choice Requires="a14">
           <p:sp>
             <p:nvSpPr>
               <p:cNvPr id="313" name="Textfeld 312">
@@ -5661,7 +5662,7 @@
             </p:txBody>
           </p:sp>
         </mc:Choice>
-        <mc:Fallback>
+        <mc:Fallback xmlns="">
           <p:sp>
             <p:nvSpPr>
               <p:cNvPr id="313" name="Textfeld 312">
@@ -5709,8 +5710,8 @@
           </p:sp>
         </mc:Fallback>
       </mc:AlternateContent>
-      <mc:AlternateContent xmlns:mc="http://schemas.openxmlformats.org/markup-compatibility/2006">
-        <mc:Choice xmlns:a14="http://schemas.microsoft.com/office/drawing/2010/main" Requires="a14">
+      <mc:AlternateContent xmlns:mc="http://schemas.openxmlformats.org/markup-compatibility/2006" xmlns:a14="http://schemas.microsoft.com/office/drawing/2010/main">
+        <mc:Choice Requires="a14">
           <p:sp>
             <p:nvSpPr>
               <p:cNvPr id="314" name="Textfeld 313">
@@ -5800,7 +5801,7 @@
             </p:txBody>
           </p:sp>
         </mc:Choice>
-        <mc:Fallback>
+        <mc:Fallback xmlns="">
           <p:sp>
             <p:nvSpPr>
               <p:cNvPr id="314" name="Textfeld 313">
@@ -5848,8 +5849,8 @@
           </p:sp>
         </mc:Fallback>
       </mc:AlternateContent>
-      <mc:AlternateContent xmlns:mc="http://schemas.openxmlformats.org/markup-compatibility/2006">
-        <mc:Choice xmlns:a14="http://schemas.microsoft.com/office/drawing/2010/main" Requires="a14">
+      <mc:AlternateContent xmlns:mc="http://schemas.openxmlformats.org/markup-compatibility/2006" xmlns:a14="http://schemas.microsoft.com/office/drawing/2010/main">
+        <mc:Choice Requires="a14">
           <p:sp>
             <p:nvSpPr>
               <p:cNvPr id="315" name="Textfeld 314">
@@ -5878,6 +5879,7 @@
               </a:bodyPr>
               <a:lstStyle/>
               <a:p>
+                <a:pPr/>
                 <a14:m>
                   <m:oMathPara xmlns:m="http://schemas.openxmlformats.org/officeDocument/2006/math">
                     <m:oMathParaPr>
@@ -5920,7 +5922,7 @@
             </p:txBody>
           </p:sp>
         </mc:Choice>
-        <mc:Fallback>
+        <mc:Fallback xmlns="">
           <p:sp>
             <p:nvSpPr>
               <p:cNvPr id="315" name="Textfeld 314">
@@ -5965,8 +5967,8 @@
           </p:sp>
         </mc:Fallback>
       </mc:AlternateContent>
-      <mc:AlternateContent xmlns:mc="http://schemas.openxmlformats.org/markup-compatibility/2006">
-        <mc:Choice xmlns:a14="http://schemas.microsoft.com/office/drawing/2010/main" Requires="a14">
+      <mc:AlternateContent xmlns:mc="http://schemas.openxmlformats.org/markup-compatibility/2006" xmlns:a14="http://schemas.microsoft.com/office/drawing/2010/main">
+        <mc:Choice Requires="a14">
           <p:sp>
             <p:nvSpPr>
               <p:cNvPr id="316" name="Textfeld 315">
@@ -5995,6 +5997,7 @@
               </a:bodyPr>
               <a:lstStyle/>
               <a:p>
+                <a:pPr/>
                 <a14:m>
                   <m:oMathPara xmlns:m="http://schemas.openxmlformats.org/officeDocument/2006/math">
                     <m:oMathParaPr>
@@ -6037,7 +6040,7 @@
             </p:txBody>
           </p:sp>
         </mc:Choice>
-        <mc:Fallback>
+        <mc:Fallback xmlns="">
           <p:sp>
             <p:nvSpPr>
               <p:cNvPr id="316" name="Textfeld 315">
@@ -6092,13 +6095,6 @@
   <p:clrMapOvr>
     <a:masterClrMapping/>
   </p:clrMapOvr>
-  <p:timing>
-    <p:tnLst>
-      <p:par>
-        <p:cTn id="1" dur="indefinite" restart="never" nodeType="tmRoot"/>
-      </p:par>
-    </p:tnLst>
-  </p:timing>
 </p:sld>
 </file>
 

</xml_diff>